<commit_message>
Update and interlink talks
</commit_message>
<xml_diff>
--- a/CSNS_March_2019/4_Thursday_March_28th/8_iFit/iFit.pptx
+++ b/CSNS_March_2019/4_Thursday_March_28th/8_iFit/iFit.pptx
@@ -17935,6 +17935,47 @@
             <a:pPr/>
           </a:p>
           <a:p>
+            <a:pPr marL="180473" indent="-180473"/>
+            <a:r>
+              <a:t>Launch iFit/Matlab and load data from one or more of the TOF monitor outputs of the scan, TOF spectrometer exercise, e.g.</a:t>
+            </a:r>
+          </a:p>
+          <a:p>
+            <a:pPr lvl="1" marL="561473" indent="-180473">
+              <a:buChar char="•"/>
+            </a:pPr>
+            <a:r>
+              <a:t>a=iData(‘folder/5/in5*.t’)</a:t>
+            </a:r>
+          </a:p>
+          <a:p>
+            <a:pPr lvl="1" marL="561473" indent="-180473">
+              <a:buChar char="•"/>
+            </a:pPr>
+            <a:r>
+              <a:t>a.error=1</a:t>
+            </a:r>
+          </a:p>
+          <a:p>
+            <a:pPr lvl="1" marL="561473" indent="-180473">
+              <a:buChar char="•"/>
+            </a:pPr>
+            <a:r>
+              <a:t>fits(a,’gauss’)</a:t>
+            </a:r>
+          </a:p>
+          <a:p>
+            <a:pPr lvl="1" marL="561473" indent="-180473">
+              <a:buChar char="•"/>
+            </a:pPr>
+            <a:r>
+              <a:t>plot(a)</a:t>
+            </a:r>
+          </a:p>
+          <a:p>
+            <a:pPr/>
+          </a:p>
+          <a:p>
             <a:pPr/>
             <a:r>
               <a:t>Use the instructions at </a:t>

</xml_diff>